<commit_message>
minor changes to the abstract
</commit_message>
<xml_diff>
--- a/figs/SysVSEnv.pptx
+++ b/figs/SysVSEnv.pptx
@@ -254,7 +254,7 @@
           <a:p>
             <a:fld id="{F4B7BB12-549B-4158-AC52-BE4DF3B78EEB}" type="datetimeFigureOut">
               <a:rPr lang="en-US" smtClean="0"/>
-              <a:t>4/29/2015</a:t>
+              <a:t>5/3/2015</a:t>
             </a:fld>
             <a:endParaRPr lang="en-US"/>
           </a:p>
@@ -424,7 +424,7 @@
           <a:p>
             <a:fld id="{F4B7BB12-549B-4158-AC52-BE4DF3B78EEB}" type="datetimeFigureOut">
               <a:rPr lang="en-US" smtClean="0"/>
-              <a:t>4/29/2015</a:t>
+              <a:t>5/3/2015</a:t>
             </a:fld>
             <a:endParaRPr lang="en-US"/>
           </a:p>
@@ -604,7 +604,7 @@
           <a:p>
             <a:fld id="{F4B7BB12-549B-4158-AC52-BE4DF3B78EEB}" type="datetimeFigureOut">
               <a:rPr lang="en-US" smtClean="0"/>
-              <a:t>4/29/2015</a:t>
+              <a:t>5/3/2015</a:t>
             </a:fld>
             <a:endParaRPr lang="en-US"/>
           </a:p>
@@ -774,7 +774,7 @@
           <a:p>
             <a:fld id="{F4B7BB12-549B-4158-AC52-BE4DF3B78EEB}" type="datetimeFigureOut">
               <a:rPr lang="en-US" smtClean="0"/>
-              <a:t>4/29/2015</a:t>
+              <a:t>5/3/2015</a:t>
             </a:fld>
             <a:endParaRPr lang="en-US"/>
           </a:p>
@@ -1020,7 +1020,7 @@
           <a:p>
             <a:fld id="{F4B7BB12-549B-4158-AC52-BE4DF3B78EEB}" type="datetimeFigureOut">
               <a:rPr lang="en-US" smtClean="0"/>
-              <a:t>4/29/2015</a:t>
+              <a:t>5/3/2015</a:t>
             </a:fld>
             <a:endParaRPr lang="en-US"/>
           </a:p>
@@ -1252,7 +1252,7 @@
           <a:p>
             <a:fld id="{F4B7BB12-549B-4158-AC52-BE4DF3B78EEB}" type="datetimeFigureOut">
               <a:rPr lang="en-US" smtClean="0"/>
-              <a:t>4/29/2015</a:t>
+              <a:t>5/3/2015</a:t>
             </a:fld>
             <a:endParaRPr lang="en-US"/>
           </a:p>
@@ -1619,7 +1619,7 @@
           <a:p>
             <a:fld id="{F4B7BB12-549B-4158-AC52-BE4DF3B78EEB}" type="datetimeFigureOut">
               <a:rPr lang="en-US" smtClean="0"/>
-              <a:t>4/29/2015</a:t>
+              <a:t>5/3/2015</a:t>
             </a:fld>
             <a:endParaRPr lang="en-US"/>
           </a:p>
@@ -1737,7 +1737,7 @@
           <a:p>
             <a:fld id="{F4B7BB12-549B-4158-AC52-BE4DF3B78EEB}" type="datetimeFigureOut">
               <a:rPr lang="en-US" smtClean="0"/>
-              <a:t>4/29/2015</a:t>
+              <a:t>5/3/2015</a:t>
             </a:fld>
             <a:endParaRPr lang="en-US"/>
           </a:p>
@@ -1832,7 +1832,7 @@
           <a:p>
             <a:fld id="{F4B7BB12-549B-4158-AC52-BE4DF3B78EEB}" type="datetimeFigureOut">
               <a:rPr lang="en-US" smtClean="0"/>
-              <a:t>4/29/2015</a:t>
+              <a:t>5/3/2015</a:t>
             </a:fld>
             <a:endParaRPr lang="en-US"/>
           </a:p>
@@ -2109,7 +2109,7 @@
           <a:p>
             <a:fld id="{F4B7BB12-549B-4158-AC52-BE4DF3B78EEB}" type="datetimeFigureOut">
               <a:rPr lang="en-US" smtClean="0"/>
-              <a:t>4/29/2015</a:t>
+              <a:t>5/3/2015</a:t>
             </a:fld>
             <a:endParaRPr lang="en-US"/>
           </a:p>
@@ -2362,7 +2362,7 @@
           <a:p>
             <a:fld id="{F4B7BB12-549B-4158-AC52-BE4DF3B78EEB}" type="datetimeFigureOut">
               <a:rPr lang="en-US" smtClean="0"/>
-              <a:t>4/29/2015</a:t>
+              <a:t>5/3/2015</a:t>
             </a:fld>
             <a:endParaRPr lang="en-US"/>
           </a:p>
@@ -2575,7 +2575,7 @@
           <a:p>
             <a:fld id="{F4B7BB12-549B-4158-AC52-BE4DF3B78EEB}" type="datetimeFigureOut">
               <a:rPr lang="en-US" smtClean="0"/>
-              <a:t>4/29/2015</a:t>
+              <a:t>5/3/2015</a:t>
             </a:fld>
             <a:endParaRPr lang="en-US"/>
           </a:p>
@@ -2988,8 +2988,8 @@
         </p:nvSpPr>
         <p:spPr>
           <a:xfrm>
-            <a:off x="5648000" y="2317597"/>
-            <a:ext cx="1740935" cy="1224186"/>
+            <a:off x="5733919" y="2625123"/>
+            <a:ext cx="1487975" cy="916659"/>
           </a:xfrm>
           <a:prstGeom prst="rect">
             <a:avLst/>
@@ -3243,8 +3243,8 @@
         </p:nvSpPr>
         <p:spPr>
           <a:xfrm>
-            <a:off x="6095870" y="2537927"/>
-            <a:ext cx="1194317" cy="865575"/>
+            <a:off x="6310481" y="2802474"/>
+            <a:ext cx="829296" cy="601028"/>
           </a:xfrm>
           <a:prstGeom prst="ellipse">
             <a:avLst/>
@@ -3364,8 +3364,8 @@
           </a:fontRef>
         </p:style>
       </p:cxnSp>
-      <mc:AlternateContent xmlns:mc="http://schemas.openxmlformats.org/markup-compatibility/2006">
-        <mc:Choice xmlns:a14="http://schemas.microsoft.com/office/drawing/2010/main" Requires="a14">
+      <mc:AlternateContent xmlns:mc="http://schemas.openxmlformats.org/markup-compatibility/2006" xmlns:a14="http://schemas.microsoft.com/office/drawing/2010/main">
+        <mc:Choice Requires="a14">
           <p:sp>
             <p:nvSpPr>
               <p:cNvPr id="28" name="文本框 27"/>
@@ -3437,7 +3437,7 @@
             </p:txBody>
           </p:sp>
         </mc:Choice>
-        <mc:Fallback>
+        <mc:Fallback xmlns="">
           <p:sp>
             <p:nvSpPr>
               <p:cNvPr id="28" name="文本框 27"/>
@@ -3476,8 +3476,8 @@
           </p:sp>
         </mc:Fallback>
       </mc:AlternateContent>
-      <mc:AlternateContent xmlns:mc="http://schemas.openxmlformats.org/markup-compatibility/2006">
-        <mc:Choice xmlns:a14="http://schemas.microsoft.com/office/drawing/2010/main" Requires="a14">
+      <mc:AlternateContent xmlns:mc="http://schemas.openxmlformats.org/markup-compatibility/2006" xmlns:a14="http://schemas.microsoft.com/office/drawing/2010/main">
+        <mc:Choice Requires="a14">
           <p:sp>
             <p:nvSpPr>
               <p:cNvPr id="30" name="文本框 29"/>
@@ -3553,7 +3553,7 @@
             </p:txBody>
           </p:sp>
         </mc:Choice>
-        <mc:Fallback>
+        <mc:Fallback xmlns="">
           <p:sp>
             <p:nvSpPr>
               <p:cNvPr id="30" name="文本框 29"/>
@@ -3602,7 +3602,7 @@
             </p:nvSpPr>
             <p:spPr>
               <a:xfrm>
-                <a:off x="6678412" y="2994399"/>
+                <a:off x="6687643" y="3069212"/>
                 <a:ext cx="367408" cy="307777"/>
               </a:xfrm>
               <a:prstGeom prst="rect">
@@ -3664,7 +3664,7 @@
             </p:nvSpPr>
             <p:spPr>
               <a:xfrm>
-                <a:off x="6678412" y="2994399"/>
+                <a:off x="6687643" y="3069212"/>
                 <a:ext cx="367408" cy="307777"/>
               </a:xfrm>
               <a:prstGeom prst="rect">
@@ -3737,8 +3737,8 @@
           </a:p>
         </p:txBody>
       </p:sp>
-      <mc:AlternateContent xmlns:mc="http://schemas.openxmlformats.org/markup-compatibility/2006">
-        <mc:Choice xmlns:a14="http://schemas.microsoft.com/office/drawing/2010/main" Requires="a14">
+      <mc:AlternateContent xmlns:mc="http://schemas.openxmlformats.org/markup-compatibility/2006" xmlns:a14="http://schemas.microsoft.com/office/drawing/2010/main">
+        <mc:Choice Requires="a14">
           <p:sp>
             <p:nvSpPr>
               <p:cNvPr id="29" name="文本框 28"/>
@@ -3810,7 +3810,7 @@
             </p:txBody>
           </p:sp>
         </mc:Choice>
-        <mc:Fallback>
+        <mc:Fallback xmlns="">
           <p:sp>
             <p:nvSpPr>
               <p:cNvPr id="29" name="文本框 28"/>
@@ -3932,8 +3932,8 @@
           </a:p>
         </p:txBody>
       </p:sp>
-      <mc:AlternateContent xmlns:mc="http://schemas.openxmlformats.org/markup-compatibility/2006">
-        <mc:Choice xmlns:a14="http://schemas.microsoft.com/office/drawing/2010/main" Requires="a14">
+      <mc:AlternateContent xmlns:mc="http://schemas.openxmlformats.org/markup-compatibility/2006" xmlns:a14="http://schemas.microsoft.com/office/drawing/2010/main">
+        <mc:Choice Requires="a14">
           <p:sp>
             <p:nvSpPr>
               <p:cNvPr id="49" name="文本框 48"/>
@@ -3956,6 +3956,7 @@
               </a:bodyPr>
               <a:lstStyle/>
               <a:p>
+                <a:pPr/>
                 <a14:m>
                   <m:oMathPara xmlns:m="http://schemas.openxmlformats.org/officeDocument/2006/math">
                     <m:oMathParaPr>
@@ -3995,7 +3996,7 @@
             </p:txBody>
           </p:sp>
         </mc:Choice>
-        <mc:Fallback>
+        <mc:Fallback xmlns="">
           <p:sp>
             <p:nvSpPr>
               <p:cNvPr id="49" name="文本框 48"/>
@@ -4172,8 +4173,8 @@
           </a:fontRef>
         </p:style>
       </p:cxnSp>
-      <mc:AlternateContent xmlns:mc="http://schemas.openxmlformats.org/markup-compatibility/2006">
-        <mc:Choice xmlns:a14="http://schemas.microsoft.com/office/drawing/2010/main" Requires="a14">
+      <mc:AlternateContent xmlns:mc="http://schemas.openxmlformats.org/markup-compatibility/2006" xmlns:a14="http://schemas.microsoft.com/office/drawing/2010/main">
+        <mc:Choice Requires="a14">
           <p:sp>
             <p:nvSpPr>
               <p:cNvPr id="3" name="文本框 2"/>
@@ -4196,6 +4197,7 @@
               </a:bodyPr>
               <a:lstStyle/>
               <a:p>
+                <a:pPr/>
                 <a14:m>
                   <m:oMathPara xmlns:m="http://schemas.openxmlformats.org/officeDocument/2006/math">
                     <m:oMathParaPr>
@@ -4235,7 +4237,7 @@
             </p:txBody>
           </p:sp>
         </mc:Choice>
-        <mc:Fallback>
+        <mc:Fallback xmlns="">
           <p:sp>
             <p:nvSpPr>
               <p:cNvPr id="3" name="文本框 2"/>
@@ -4284,7 +4286,7 @@
             </p:nvSpPr>
             <p:spPr>
               <a:xfrm>
-                <a:off x="3229529" y="2561447"/>
+                <a:off x="3388156" y="2477468"/>
                 <a:ext cx="471476" cy="215444"/>
               </a:xfrm>
               <a:prstGeom prst="rect">
@@ -4298,6 +4300,7 @@
               </a:bodyPr>
               <a:lstStyle/>
               <a:p>
+                <a:pPr/>
                 <a14:m>
                   <m:oMathPara xmlns:m="http://schemas.openxmlformats.org/officeDocument/2006/math">
                     <m:oMathParaPr>
@@ -4351,7 +4354,7 @@
             </p:nvSpPr>
             <p:spPr>
               <a:xfrm>
-                <a:off x="3229529" y="2561447"/>
+                <a:off x="3388156" y="2477468"/>
                 <a:ext cx="471476" cy="215444"/>
               </a:xfrm>
               <a:prstGeom prst="rect">
@@ -4389,7 +4392,7 @@
             </p:nvSpPr>
             <p:spPr>
               <a:xfrm>
-                <a:off x="6450339" y="2606617"/>
+                <a:off x="6523530" y="2831449"/>
                 <a:ext cx="513602" cy="215444"/>
               </a:xfrm>
               <a:prstGeom prst="rect">
@@ -4403,6 +4406,7 @@
               </a:bodyPr>
               <a:lstStyle/>
               <a:p>
+                <a:pPr/>
                 <a14:m>
                   <m:oMathPara xmlns:m="http://schemas.openxmlformats.org/officeDocument/2006/math">
                     <m:oMathParaPr>
@@ -4456,7 +4460,7 @@
             </p:nvSpPr>
             <p:spPr>
               <a:xfrm>
-                <a:off x="6450339" y="2606617"/>
+                <a:off x="6523530" y="2831449"/>
                 <a:ext cx="513602" cy="215444"/>
               </a:xfrm>
               <a:prstGeom prst="rect">
@@ -4465,7 +4469,7 @@
               <a:blipFill rotWithShape="0">
                 <a:blip r:embed="rId9"/>
                 <a:stretch>
-                  <a:fillRect l="-7143" t="-2857" r="-13095" b="-31429"/>
+                  <a:fillRect l="-7143" t="-2778" r="-13095" b="-30556"/>
                 </a:stretch>
               </a:blipFill>
             </p:spPr>
@@ -4494,7 +4498,7 @@
             </p:nvSpPr>
             <p:spPr>
               <a:xfrm>
-                <a:off x="5667941" y="2335318"/>
+                <a:off x="5760788" y="2617306"/>
                 <a:ext cx="325345" cy="276999"/>
               </a:xfrm>
               <a:prstGeom prst="rect">
@@ -4508,6 +4512,7 @@
               </a:bodyPr>
               <a:lstStyle/>
               <a:p>
+                <a:pPr/>
                 <a14:m>
                   <m:oMathPara xmlns:m="http://schemas.openxmlformats.org/officeDocument/2006/math">
                     <m:oMathParaPr>
@@ -4564,7 +4569,7 @@
             </p:nvSpPr>
             <p:spPr>
               <a:xfrm>
-                <a:off x="5667941" y="2335318"/>
+                <a:off x="5760788" y="2617306"/>
                 <a:ext cx="325345" cy="276999"/>
               </a:xfrm>
               <a:prstGeom prst="rect">
@@ -4573,7 +4578,7 @@
               <a:blipFill rotWithShape="0">
                 <a:blip r:embed="rId10"/>
                 <a:stretch>
-                  <a:fillRect l="-20755" t="-4348" r="-3774" b="-8696"/>
+                  <a:fillRect l="-20755" t="-2174" r="-3774" b="-8696"/>
                 </a:stretch>
               </a:blipFill>
             </p:spPr>
@@ -4592,8 +4597,8 @@
           </p:sp>
         </mc:Fallback>
       </mc:AlternateContent>
-      <mc:AlternateContent xmlns:mc="http://schemas.openxmlformats.org/markup-compatibility/2006">
-        <mc:Choice xmlns:a14="http://schemas.microsoft.com/office/drawing/2010/main" Requires="a14">
+      <mc:AlternateContent xmlns:mc="http://schemas.openxmlformats.org/markup-compatibility/2006" xmlns:a14="http://schemas.microsoft.com/office/drawing/2010/main">
+        <mc:Choice Requires="a14">
           <p:sp>
             <p:nvSpPr>
               <p:cNvPr id="37" name="文本框 36"/>
@@ -4616,6 +4621,7 @@
               </a:bodyPr>
               <a:lstStyle/>
               <a:p>
+                <a:pPr/>
                 <a14:m>
                   <m:oMathPara xmlns:m="http://schemas.openxmlformats.org/officeDocument/2006/math">
                     <m:oMathParaPr>
@@ -4686,7 +4692,7 @@
             </p:txBody>
           </p:sp>
         </mc:Choice>
-        <mc:Fallback>
+        <mc:Fallback xmlns="">
           <p:sp>
             <p:nvSpPr>
               <p:cNvPr id="37" name="文本框 36"/>
@@ -4736,7 +4742,7 @@
             <p:spPr>
               <a:xfrm>
                 <a:off x="3766951" y="2717007"/>
-                <a:ext cx="531620" cy="169277"/>
+                <a:ext cx="534890" cy="169277"/>
               </a:xfrm>
               <a:prstGeom prst="rect">
                 <a:avLst/>
@@ -4749,6 +4755,7 @@
               </a:bodyPr>
               <a:lstStyle/>
               <a:p>
+                <a:pPr/>
                 <a14:m>
                   <m:oMathPara xmlns:m="http://schemas.openxmlformats.org/officeDocument/2006/math">
                     <m:oMathParaPr>
@@ -4800,7 +4807,7 @@
                               <a:latin typeface="Cambria Math" panose="02040503050406030204" pitchFamily="18" charset="0"/>
                               <a:ea typeface="Cambria Math" panose="02040503050406030204" pitchFamily="18" charset="0"/>
                             </a:rPr>
-                            <m:t>1</m:t>
+                            <m:t>2</m:t>
                           </m:r>
                         </m:sub>
                       </m:sSub>
@@ -4831,7 +4838,7 @@
             <p:spPr>
               <a:xfrm>
                 <a:off x="3766951" y="2717007"/>
-                <a:ext cx="531620" cy="169277"/>
+                <a:ext cx="534890" cy="169277"/>
               </a:xfrm>
               <a:prstGeom prst="rect">
                 <a:avLst/>
@@ -4839,7 +4846,7 @@
               <a:blipFill rotWithShape="0">
                 <a:blip r:embed="rId12"/>
                 <a:stretch>
-                  <a:fillRect l="-5747" r="-9195" b="-40741"/>
+                  <a:fillRect l="-5682" r="-9091" b="-40741"/>
                 </a:stretch>
               </a:blipFill>
             </p:spPr>
@@ -4905,8 +4912,8 @@
           </a:p>
         </p:txBody>
       </p:sp>
-      <mc:AlternateContent xmlns:mc="http://schemas.openxmlformats.org/markup-compatibility/2006">
-        <mc:Choice xmlns:a14="http://schemas.microsoft.com/office/drawing/2010/main" Requires="a14">
+      <mc:AlternateContent xmlns:mc="http://schemas.openxmlformats.org/markup-compatibility/2006" xmlns:a14="http://schemas.microsoft.com/office/drawing/2010/main">
+        <mc:Choice Requires="a14">
           <p:sp>
             <p:nvSpPr>
               <p:cNvPr id="6" name="文本框 5"/>
@@ -4929,6 +4936,7 @@
               </a:bodyPr>
               <a:lstStyle/>
               <a:p>
+                <a:pPr/>
                 <a14:m>
                   <m:oMathPara xmlns:m="http://schemas.openxmlformats.org/officeDocument/2006/math">
                     <m:oMathParaPr>
@@ -4969,7 +4977,7 @@
             </p:txBody>
           </p:sp>
         </mc:Choice>
-        <mc:Fallback>
+        <mc:Fallback xmlns="">
           <p:sp>
             <p:nvSpPr>
               <p:cNvPr id="6" name="文本框 5"/>
@@ -5018,8 +5026,8 @@
             </p:nvSpPr>
             <p:spPr>
               <a:xfrm>
-                <a:off x="5686809" y="3337533"/>
-                <a:ext cx="781304" cy="215444"/>
+                <a:off x="5755001" y="3327092"/>
+                <a:ext cx="442044" cy="215444"/>
               </a:xfrm>
               <a:prstGeom prst="rect">
                 <a:avLst/>
@@ -5032,47 +5040,13 @@
               </a:bodyPr>
               <a:lstStyle/>
               <a:p>
+                <a:pPr/>
                 <a14:m>
                   <m:oMathPara xmlns:m="http://schemas.openxmlformats.org/officeDocument/2006/math">
                     <m:oMathParaPr>
                       <m:jc m:val="centerGroup"/>
                     </m:oMathParaPr>
                     <m:oMath xmlns:m="http://schemas.openxmlformats.org/officeDocument/2006/math">
-                      <m:sSub>
-                        <m:sSubPr>
-                          <m:ctrlPr>
-                            <a:rPr lang="en-US" sz="1400" b="0" i="1" smtClean="0">
-                              <a:latin typeface="Cambria Math" panose="02040503050406030204" pitchFamily="18" charset="0"/>
-                              <a:ea typeface="Cambria Math" panose="02040503050406030204" pitchFamily="18" charset="0"/>
-                            </a:rPr>
-                          </m:ctrlPr>
-                        </m:sSubPr>
-                        <m:e>
-                          <m:r>
-                            <a:rPr lang="en-US" sz="1400" b="0" i="1" smtClean="0">
-                              <a:latin typeface="Cambria Math" panose="02040503050406030204" pitchFamily="18" charset="0"/>
-                              <a:ea typeface="Cambria Math" panose="02040503050406030204" pitchFamily="18" charset="0"/>
-                            </a:rPr>
-                            <m:t>h</m:t>
-                          </m:r>
-                        </m:e>
-                        <m:sub>
-                          <m:r>
-                            <a:rPr lang="en-US" sz="1400" b="0" i="1" smtClean="0">
-                              <a:latin typeface="Cambria Math" panose="02040503050406030204" pitchFamily="18" charset="0"/>
-                              <a:ea typeface="Cambria Math" panose="02040503050406030204" pitchFamily="18" charset="0"/>
-                            </a:rPr>
-                            <m:t>𝑎</m:t>
-                          </m:r>
-                        </m:sub>
-                      </m:sSub>
-                      <m:r>
-                        <a:rPr lang="en-US" sz="1400" b="0" i="1" smtClean="0">
-                          <a:latin typeface="Cambria Math" panose="02040503050406030204" pitchFamily="18" charset="0"/>
-                          <a:ea typeface="Cambria Math" panose="02040503050406030204" pitchFamily="18" charset="0"/>
-                        </a:rPr>
-                        <m:t>(</m:t>
-                      </m:r>
                       <m:r>
                         <a:rPr lang="en-US" sz="1400" b="0" i="1" smtClean="0">
                           <a:latin typeface="Cambria Math" panose="02040503050406030204" pitchFamily="18" charset="0"/>
@@ -5098,12 +5072,6 @@
                           </m:r>
                         </m:e>
                       </m:d>
-                      <m:r>
-                        <a:rPr lang="en-US" sz="1400" b="0" i="1" smtClean="0">
-                          <a:latin typeface="Cambria Math" panose="02040503050406030204" pitchFamily="18" charset="0"/>
-                        </a:rPr>
-                        <m:t>)</m:t>
-                      </m:r>
                     </m:oMath>
                   </m:oMathPara>
                 </a14:m>
@@ -5123,8 +5091,8 @@
             </p:nvSpPr>
             <p:spPr>
               <a:xfrm>
-                <a:off x="5686809" y="3337533"/>
-                <a:ext cx="781304" cy="215444"/>
+                <a:off x="5755001" y="3327092"/>
+                <a:ext cx="442044" cy="215444"/>
               </a:xfrm>
               <a:prstGeom prst="rect">
                 <a:avLst/>
@@ -5132,7 +5100,7 @@
               <a:blipFill rotWithShape="0">
                 <a:blip r:embed="rId14"/>
                 <a:stretch>
-                  <a:fillRect l="-5469" r="-7813" b="-30556"/>
+                  <a:fillRect l="-8219" b="-22857"/>
                 </a:stretch>
               </a:blipFill>
             </p:spPr>
@@ -5159,8 +5127,8 @@
         </p:nvSpPr>
         <p:spPr>
           <a:xfrm>
-            <a:off x="5953723" y="2739178"/>
-            <a:ext cx="606804" cy="587914"/>
+            <a:off x="5953723" y="2801720"/>
+            <a:ext cx="569807" cy="525372"/>
           </a:xfrm>
           <a:prstGeom prst="ellipse">
             <a:avLst/>

</xml_diff>